<commit_message>
#36 Small update on Embedded SW part
</commit_message>
<xml_diff>
--- a/ArchExtractor/doc/Presentation.pptx
+++ b/ArchExtractor/doc/Presentation.pptx
@@ -253,7 +253,7 @@
           <a:p>
             <a:fld id="{5F981C07-B402-4A91-A2F9-238AB9347237}" type="datetimeFigureOut">
               <a:rPr lang="en-US" smtClean="0"/>
-              <a:t>3/3/2015</a:t>
+              <a:t>3/4/2015</a:t>
             </a:fld>
             <a:endParaRPr lang="en-US"/>
           </a:p>
@@ -566,7 +566,7 @@
           <a:p>
             <a:fld id="{5F981C07-B402-4A91-A2F9-238AB9347237}" type="datetimeFigureOut">
               <a:rPr lang="en-US" smtClean="0"/>
-              <a:t>3/3/2015</a:t>
+              <a:t>3/4/2015</a:t>
             </a:fld>
             <a:endParaRPr lang="en-US"/>
           </a:p>
@@ -751,7 +751,7 @@
           <a:p>
             <a:fld id="{5F981C07-B402-4A91-A2F9-238AB9347237}" type="datetimeFigureOut">
               <a:rPr lang="en-US" smtClean="0"/>
-              <a:t>3/3/2015</a:t>
+              <a:t>3/4/2015</a:t>
             </a:fld>
             <a:endParaRPr lang="en-US"/>
           </a:p>
@@ -926,7 +926,7 @@
           <a:p>
             <a:fld id="{5F981C07-B402-4A91-A2F9-238AB9347237}" type="datetimeFigureOut">
               <a:rPr lang="en-US" smtClean="0"/>
-              <a:t>3/3/2015</a:t>
+              <a:t>3/4/2015</a:t>
             </a:fld>
             <a:endParaRPr lang="en-US"/>
           </a:p>
@@ -1194,7 +1194,7 @@
           <a:p>
             <a:fld id="{5F981C07-B402-4A91-A2F9-238AB9347237}" type="datetimeFigureOut">
               <a:rPr lang="en-US" smtClean="0"/>
-              <a:t>3/3/2015</a:t>
+              <a:t>3/4/2015</a:t>
             </a:fld>
             <a:endParaRPr lang="en-US"/>
           </a:p>
@@ -1662,7 +1662,7 @@
           <a:p>
             <a:fld id="{5F981C07-B402-4A91-A2F9-238AB9347237}" type="datetimeFigureOut">
               <a:rPr lang="en-US" smtClean="0"/>
-              <a:t>3/3/2015</a:t>
+              <a:t>3/4/2015</a:t>
             </a:fld>
             <a:endParaRPr lang="en-US"/>
           </a:p>
@@ -2151,7 +2151,7 @@
           <a:p>
             <a:fld id="{5F981C07-B402-4A91-A2F9-238AB9347237}" type="datetimeFigureOut">
               <a:rPr lang="en-US" smtClean="0"/>
-              <a:t>3/3/2015</a:t>
+              <a:t>3/4/2015</a:t>
             </a:fld>
             <a:endParaRPr lang="en-US"/>
           </a:p>
@@ -2277,7 +2277,7 @@
           <a:p>
             <a:fld id="{5F981C07-B402-4A91-A2F9-238AB9347237}" type="datetimeFigureOut">
               <a:rPr lang="en-US" smtClean="0"/>
-              <a:t>3/3/2015</a:t>
+              <a:t>3/4/2015</a:t>
             </a:fld>
             <a:endParaRPr lang="en-US"/>
           </a:p>
@@ -2421,7 +2421,7 @@
           <a:p>
             <a:fld id="{5F981C07-B402-4A91-A2F9-238AB9347237}" type="datetimeFigureOut">
               <a:rPr lang="en-US" smtClean="0"/>
-              <a:t>3/3/2015</a:t>
+              <a:t>3/4/2015</a:t>
             </a:fld>
             <a:endParaRPr lang="en-US"/>
           </a:p>
@@ -2743,7 +2743,7 @@
           <a:p>
             <a:fld id="{5F981C07-B402-4A91-A2F9-238AB9347237}" type="datetimeFigureOut">
               <a:rPr lang="en-US" smtClean="0"/>
-              <a:t>3/3/2015</a:t>
+              <a:t>3/4/2015</a:t>
             </a:fld>
             <a:endParaRPr lang="en-US"/>
           </a:p>
@@ -2877,7 +2877,7 @@
           <a:p>
             <a:fld id="{5F981C07-B402-4A91-A2F9-238AB9347237}" type="datetimeFigureOut">
               <a:rPr lang="en-US" smtClean="0"/>
-              <a:t>3/3/2015</a:t>
+              <a:t>3/4/2015</a:t>
             </a:fld>
             <a:endParaRPr lang="en-US"/>
           </a:p>
@@ -3658,7 +3658,7 @@
           <a:p>
             <a:fld id="{5F981C07-B402-4A91-A2F9-238AB9347237}" type="datetimeFigureOut">
               <a:rPr lang="en-US" smtClean="0"/>
-              <a:t>3/3/2015</a:t>
+              <a:t>3/4/2015</a:t>
             </a:fld>
             <a:endParaRPr lang="en-US"/>
           </a:p>
@@ -4355,7 +4355,7 @@
           <a:graphicData uri="http://schemas.openxmlformats.org/presentationml/2006/ole">
             <mc:AlternateContent xmlns:mc="http://schemas.openxmlformats.org/markup-compatibility/2006">
               <mc:Choice xmlns:v="urn:schemas-microsoft-com:vml" Requires="v">
-                <p:oleObj spid="_x0000_s1057" name="Microsoft Word Picture" r:id="rId3" imgW="1991868" imgH="2458212" progId="Word.Picture.8">
+                <p:oleObj spid="_x0000_s1058" name="Microsoft Word Picture" r:id="rId3" imgW="1991868" imgH="2458212" progId="Word.Picture.8">
                   <p:embed/>
                 </p:oleObj>
               </mc:Choice>
@@ -4558,7 +4558,6 @@
               <a:rPr lang="bg-BG" dirty="0"/>
               <a:t>основно правило за слоевете, е че само два съседни слоя могат да комуникират по между си</a:t>
             </a:r>
-            <a:endParaRPr lang="bg-BG" dirty="0"/>
           </a:p>
         </p:txBody>
       </p:sp>
@@ -5180,55 +5179,39 @@
         </p:spPr>
         <p:txBody>
           <a:bodyPr>
-            <a:normAutofit fontScale="92500"/>
+            <a:normAutofit fontScale="85000" lnSpcReduction="10000"/>
           </a:bodyPr>
           <a:lstStyle/>
           <a:p>
             <a:r>
-              <a:rPr lang="bg-BG" sz="2000" i="1" dirty="0"/>
+              <a:rPr lang="bg-BG" sz="2000" i="1" dirty="0" smtClean="0"/>
               <a:t>Софтуерът за вградени системи</a:t>
             </a:r>
             <a:r>
-              <a:rPr lang="bg-BG" sz="2000" dirty="0"/>
+              <a:rPr lang="bg-BG" sz="2000" dirty="0" smtClean="0"/>
               <a:t> или накратко казано </a:t>
             </a:r>
             <a:r>
-              <a:rPr lang="bg-BG" sz="2000" i="1" dirty="0"/>
+              <a:rPr lang="bg-BG" sz="2000" i="1" dirty="0" smtClean="0"/>
               <a:t>вграден софтуер</a:t>
             </a:r>
             <a:r>
-              <a:rPr lang="bg-BG" sz="2000" dirty="0"/>
-              <a:t>, е компютърен софтуер, който управлява машини или устройства, които обикновено не се считат за </a:t>
-            </a:r>
-            <a:r>
               <a:rPr lang="bg-BG" sz="2000" dirty="0" smtClean="0"/>
-              <a:t>компютри</a:t>
+              <a:t>, е компютърен софтуер, който управлява машини или устройства, които обикновено не се считат за компютри</a:t>
             </a:r>
             <a:endParaRPr lang="en-US" sz="2000" dirty="0" smtClean="0"/>
           </a:p>
           <a:p>
             <a:r>
-              <a:rPr lang="bg-BG" sz="2000" dirty="0"/>
-              <a:t>Вградените системи продължават да навлизат все повече и повече в нашия живот, като растежа на разпространението им е </a:t>
-            </a:r>
-            <a:r>
               <a:rPr lang="bg-BG" sz="2000" dirty="0" smtClean="0"/>
-              <a:t>огромен</a:t>
+              <a:t>Вградените системи продължават да навлизат все повече и повече в нашия живот, като растежа на разпространението им е огромен</a:t>
             </a:r>
             <a:endParaRPr lang="en-US" sz="2000" dirty="0" smtClean="0"/>
           </a:p>
           <a:p>
             <a:r>
               <a:rPr lang="bg-BG" sz="2000" dirty="0" smtClean="0"/>
-              <a:t>трябва </a:t>
-            </a:r>
-            <a:r>
-              <a:rPr lang="bg-BG" sz="2000" dirty="0"/>
-              <a:t>да отговарят на нарастващ брой изисквания за функционалност, време за реагиране, ограничения към процесорно време и памет, консумация на енергия, цена и т.н</a:t>
-            </a:r>
-            <a:r>
-              <a:rPr lang="bg-BG" sz="2000" dirty="0" smtClean="0"/>
-              <a:t>.</a:t>
+              <a:t>трябва да отговарят на нарастващ брой изисквания за функционалност, време за реагиране, ограничения към процесорно време и памет, консумация на енергия, цена и т.н.</a:t>
             </a:r>
             <a:endParaRPr lang="en-US" sz="2000" dirty="0" smtClean="0"/>
           </a:p>
@@ -5240,27 +5223,19 @@
               <a:t>SOA</a:t>
             </a:r>
             <a:r>
-              <a:rPr lang="en-US" sz="2000" dirty="0"/>
+              <a:rPr lang="en-US" sz="2000" dirty="0" smtClean="0"/>
               <a:t>, </a:t>
             </a:r>
             <a:r>
-              <a:rPr lang="bg-BG" sz="2000" dirty="0"/>
-              <a:t>CORBA, DCOM/COM, Enterprise JavaBeans и т.н. не са подходящи за вградените системи, тъй като компонентите създадени от тях, не отговарят на голяма част от гореспоменатите изисквания</a:t>
-            </a:r>
-            <a:r>
               <a:rPr lang="bg-BG" sz="2000" dirty="0" smtClean="0"/>
-              <a:t>.</a:t>
+              <a:t>CORBA, DCOM/COM, Enterprise JavaBeans и т.н. не са подходящи за вградените системи, тъй като компонентите създадени от тях, не отговарят на голяма част от гореспоменатите изисквания.</a:t>
             </a:r>
             <a:endParaRPr lang="en-US" sz="2000" dirty="0" smtClean="0"/>
           </a:p>
           <a:p>
             <a:r>
-              <a:rPr lang="bg-BG" sz="2000" dirty="0"/>
-              <a:t>най-често езика за разработка е „C</a:t>
-            </a:r>
-            <a:r>
               <a:rPr lang="bg-BG" sz="2000" dirty="0" smtClean="0"/>
-              <a:t>”</a:t>
+              <a:t>най-често езика за разработка е „C”</a:t>
             </a:r>
             <a:r>
               <a:rPr lang="en-US" sz="2000" dirty="0" smtClean="0"/>
@@ -5284,23 +5259,26 @@
             </a:r>
             <a:r>
               <a:rPr lang="bg-BG" sz="2000" dirty="0" smtClean="0"/>
-              <a:t> </a:t>
-            </a:r>
+              <a:t> почти невъзможно да се прилагат и способностите на инструментите за моделиране, особено </a:t>
+            </a:r>
+            <a:r>
+              <a:rPr lang="bg-BG" sz="2000" b="1" dirty="0" smtClean="0"/>
+              <a:t>извличане на моделна информация</a:t>
+            </a:r>
+            <a:r>
+              <a:rPr lang="bg-BG" sz="2000" dirty="0" smtClean="0"/>
+              <a:t> и </a:t>
+            </a:r>
+            <a:r>
+              <a:rPr lang="bg-BG" sz="2000" b="1" dirty="0" smtClean="0"/>
+              <a:t>генериране на код</a:t>
+            </a:r>
+            <a:endParaRPr lang="en-US" sz="2000" b="1" dirty="0" smtClean="0"/>
+          </a:p>
+          <a:p>
             <a:r>
               <a:rPr lang="bg-BG" sz="2000" dirty="0"/>
-              <a:t>почти невъзможно да се прилагат и способностите на инструментите за моделиране, особено </a:t>
-            </a:r>
-            <a:r>
-              <a:rPr lang="bg-BG" sz="2000" b="1" dirty="0"/>
-              <a:t>извличане на моделна информация</a:t>
-            </a:r>
-            <a:r>
-              <a:rPr lang="bg-BG" sz="2000" dirty="0"/>
-              <a:t> и </a:t>
-            </a:r>
-            <a:r>
-              <a:rPr lang="bg-BG" sz="2000" b="1" dirty="0"/>
-              <a:t>генериране на код</a:t>
+              <a:t>Това налага нестандартен подход към анализа на тези системи, тъй като за разлика от съвременните обектни езици за програмиране (като C++, C#, JAVA и т.н), езикът „C” е слабо поддържан от инструментите за UML обработка и дизайн</a:t>
             </a:r>
             <a:endParaRPr lang="en-US" sz="2000" dirty="0"/>
           </a:p>

</xml_diff>